<commit_message>
add API module teaching
</commit_message>
<xml_diff>
--- a/Py Web Unit2d.pptx
+++ b/Py Web Unit2d.pptx
@@ -4616,7 +4616,7 @@
   <pc:docChgLst>
     <pc:chgData name="Li Lixiang" userId="6104bbfcb56aea79" providerId="LiveId" clId="{4A6BFB3D-8FEE-49BB-BB68-AE48566889A3}"/>
     <pc:docChg chg="undo custSel addSld delSld modSld sldOrd">
-      <pc:chgData name="Li Lixiang" userId="6104bbfcb56aea79" providerId="LiveId" clId="{4A6BFB3D-8FEE-49BB-BB68-AE48566889A3}" dt="2021-12-16T12:31:16.360" v="5317" actId="478"/>
+      <pc:chgData name="Li Lixiang" userId="6104bbfcb56aea79" providerId="LiveId" clId="{4A6BFB3D-8FEE-49BB-BB68-AE48566889A3}" dt="2022-01-06T11:50:44.269" v="5485" actId="1076"/>
       <pc:docMkLst>
         <pc:docMk/>
       </pc:docMkLst>
@@ -5252,7 +5252,7 @@
         </pc:sldMkLst>
       </pc:sldChg>
       <pc:sldChg chg="addSp delSp modSp new mod">
-        <pc:chgData name="Li Lixiang" userId="6104bbfcb56aea79" providerId="LiveId" clId="{4A6BFB3D-8FEE-49BB-BB68-AE48566889A3}" dt="2021-11-13T15:02:12.998" v="4927" actId="20577"/>
+        <pc:chgData name="Li Lixiang" userId="6104bbfcb56aea79" providerId="LiveId" clId="{4A6BFB3D-8FEE-49BB-BB68-AE48566889A3}" dt="2022-01-06T11:50:44.269" v="5485" actId="1076"/>
         <pc:sldMkLst>
           <pc:docMk/>
           <pc:sldMk cId="3331037591" sldId="306"/>
@@ -5266,7 +5266,7 @@
           </ac:spMkLst>
         </pc:spChg>
         <pc:spChg chg="mod">
-          <ac:chgData name="Li Lixiang" userId="6104bbfcb56aea79" providerId="LiveId" clId="{4A6BFB3D-8FEE-49BB-BB68-AE48566889A3}" dt="2021-11-13T15:02:12.998" v="4927" actId="20577"/>
+          <ac:chgData name="Li Lixiang" userId="6104bbfcb56aea79" providerId="LiveId" clId="{4A6BFB3D-8FEE-49BB-BB68-AE48566889A3}" dt="2022-01-06T11:50:02.943" v="5482" actId="20577"/>
           <ac:spMkLst>
             <pc:docMk/>
             <pc:sldMk cId="3331037591" sldId="306"/>
@@ -5282,7 +5282,15 @@
           </ac:picMkLst>
         </pc:picChg>
         <pc:picChg chg="add mod">
-          <ac:chgData name="Li Lixiang" userId="6104bbfcb56aea79" providerId="LiveId" clId="{4A6BFB3D-8FEE-49BB-BB68-AE48566889A3}" dt="2021-11-13T15:02:04.002" v="4925" actId="1076"/>
+          <ac:chgData name="Li Lixiang" userId="6104bbfcb56aea79" providerId="LiveId" clId="{4A6BFB3D-8FEE-49BB-BB68-AE48566889A3}" dt="2022-01-06T11:50:44.269" v="5485" actId="1076"/>
+          <ac:picMkLst>
+            <pc:docMk/>
+            <pc:sldMk cId="3331037591" sldId="306"/>
+            <ac:picMk id="5" creationId="{A75BD4B3-35EF-4E98-A858-525608A02C0E}"/>
+          </ac:picMkLst>
+        </pc:picChg>
+        <pc:picChg chg="add del mod">
+          <ac:chgData name="Li Lixiang" userId="6104bbfcb56aea79" providerId="LiveId" clId="{4A6BFB3D-8FEE-49BB-BB68-AE48566889A3}" dt="2022-01-06T11:50:12.858" v="5483" actId="478"/>
           <ac:picMkLst>
             <pc:docMk/>
             <pc:sldMk cId="3331037591" sldId="306"/>
@@ -5940,7 +5948,7 @@
             <a:fld id="{A5B0A250-5CC0-1746-B209-08E8B0DAE6AF}" type="datetimeFigureOut">
               <a:rPr lang="en-US" smtClean="0"/>
               <a:pPr algn="l"/>
-              <a:t>12/16/2021</a:t>
+              <a:t>1/6/2022</a:t>
             </a:fld>
             <a:endParaRPr lang="en-US" dirty="0"/>
           </a:p>
@@ -6119,7 +6127,7 @@
           <a:p>
             <a:fld id="{A5B0A250-5CC0-1746-B209-08E8B0DAE6AF}" type="datetimeFigureOut">
               <a:rPr lang="en-US" smtClean="0"/>
-              <a:t>12/16/2021</a:t>
+              <a:t>1/6/2022</a:t>
             </a:fld>
             <a:endParaRPr lang="en-US" dirty="0"/>
           </a:p>
@@ -6299,7 +6307,7 @@
           <a:p>
             <a:fld id="{A5B0A250-5CC0-1746-B209-08E8B0DAE6AF}" type="datetimeFigureOut">
               <a:rPr lang="en-US" smtClean="0"/>
-              <a:t>12/16/2021</a:t>
+              <a:t>1/6/2022</a:t>
             </a:fld>
             <a:endParaRPr lang="en-US"/>
           </a:p>
@@ -6469,7 +6477,7 @@
           <a:p>
             <a:fld id="{A5B0A250-5CC0-1746-B209-08E8B0DAE6AF}" type="datetimeFigureOut">
               <a:rPr lang="en-US" smtClean="0"/>
-              <a:t>12/16/2021</a:t>
+              <a:t>1/6/2022</a:t>
             </a:fld>
             <a:endParaRPr lang="en-US" dirty="0"/>
           </a:p>
@@ -6782,7 +6790,7 @@
           <a:p>
             <a:fld id="{A5B0A250-5CC0-1746-B209-08E8B0DAE6AF}" type="datetimeFigureOut">
               <a:rPr lang="en-US" smtClean="0"/>
-              <a:t>12/16/2021</a:t>
+              <a:t>1/6/2022</a:t>
             </a:fld>
             <a:endParaRPr lang="en-US" dirty="0"/>
           </a:p>
@@ -7168,7 +7176,7 @@
           <a:p>
             <a:fld id="{A5B0A250-5CC0-1746-B209-08E8B0DAE6AF}" type="datetimeFigureOut">
               <a:rPr lang="en-US" smtClean="0"/>
-              <a:t>12/16/2021</a:t>
+              <a:t>1/6/2022</a:t>
             </a:fld>
             <a:endParaRPr lang="en-US" dirty="0"/>
           </a:p>
@@ -7602,7 +7610,7 @@
           <a:p>
             <a:fld id="{A5B0A250-5CC0-1746-B209-08E8B0DAE6AF}" type="datetimeFigureOut">
               <a:rPr lang="en-US" smtClean="0"/>
-              <a:t>12/16/2021</a:t>
+              <a:t>1/6/2022</a:t>
             </a:fld>
             <a:endParaRPr lang="en-US" dirty="0"/>
           </a:p>
@@ -7720,7 +7728,7 @@
           <a:p>
             <a:fld id="{A5B0A250-5CC0-1746-B209-08E8B0DAE6AF}" type="datetimeFigureOut">
               <a:rPr lang="en-US" smtClean="0"/>
-              <a:t>12/16/2021</a:t>
+              <a:t>1/6/2022</a:t>
             </a:fld>
             <a:endParaRPr lang="en-US" dirty="0"/>
           </a:p>
@@ -7816,7 +7824,7 @@
             <a:fld id="{A5B0A250-5CC0-1746-B209-08E8B0DAE6AF}" type="datetimeFigureOut">
               <a:rPr lang="en-US" smtClean="0"/>
               <a:pPr/>
-              <a:t>12/16/2021</a:t>
+              <a:t>1/6/2022</a:t>
             </a:fld>
             <a:endParaRPr lang="en-US" dirty="0"/>
           </a:p>
@@ -8167,7 +8175,7 @@
           <a:p>
             <a:fld id="{A5B0A250-5CC0-1746-B209-08E8B0DAE6AF}" type="datetimeFigureOut">
               <a:rPr lang="en-US" smtClean="0"/>
-              <a:t>12/16/2021</a:t>
+              <a:t>1/6/2022</a:t>
             </a:fld>
             <a:endParaRPr lang="en-US" dirty="0"/>
           </a:p>
@@ -8592,7 +8600,7 @@
           <a:p>
             <a:fld id="{A5B0A250-5CC0-1746-B209-08E8B0DAE6AF}" type="datetimeFigureOut">
               <a:rPr lang="en-US" smtClean="0"/>
-              <a:t>12/16/2021</a:t>
+              <a:t>1/6/2022</a:t>
             </a:fld>
             <a:endParaRPr lang="en-US" dirty="0"/>
           </a:p>
@@ -8874,7 +8882,7 @@
             <a:fld id="{A5B0A250-5CC0-1746-B209-08E8B0DAE6AF}" type="datetimeFigureOut">
               <a:rPr lang="en-US" smtClean="0"/>
               <a:pPr/>
-              <a:t>12/16/2021</a:t>
+              <a:t>1/6/2022</a:t>
             </a:fld>
             <a:endParaRPr lang="en-US" dirty="0"/>
           </a:p>
@@ -12738,18 +12746,17 @@
           <a:p>
             <a:r>
               <a:rPr lang="en-US" dirty="0"/>
-              <a:t>Whenever there is a request, session will be extended</a:t>
-            </a:r>
-            <a:endParaRPr lang="en-MY" dirty="0"/>
+              <a:t>The SESSION_SAVE_EVERY_REQUEST, will save session data on every request even the session data did not change. Normally does not need it.</a:t>
+            </a:r>
           </a:p>
         </p:txBody>
       </p:sp>
       <p:pic>
         <p:nvPicPr>
-          <p:cNvPr id="6" name="Picture 5">
+          <p:cNvPr id="5" name="Picture 4">
             <a:extLst>
               <a:ext uri="{FF2B5EF4-FFF2-40B4-BE49-F238E27FC236}">
-                <a16:creationId xmlns:a16="http://schemas.microsoft.com/office/drawing/2014/main" id="{3F751F02-AE11-4F93-8682-05591A4ED6C1}"/>
+                <a16:creationId xmlns:a16="http://schemas.microsoft.com/office/drawing/2014/main" id="{A75BD4B3-35EF-4E98-A858-525608A02C0E}"/>
               </a:ext>
             </a:extLst>
           </p:cNvPr>
@@ -12766,8 +12773,8 @@
         </p:blipFill>
         <p:spPr>
           <a:xfrm>
-            <a:off x="2831011" y="4032301"/>
-            <a:ext cx="4925112" cy="1124107"/>
+            <a:off x="2885708" y="4538586"/>
+            <a:ext cx="5258534" cy="1095528"/>
           </a:xfrm>
           <a:prstGeom prst="rect">
             <a:avLst/>

</xml_diff>